<commit_message>
Fixed typo in PPT
</commit_message>
<xml_diff>
--- a/presentation/PrefixSum.pptx
+++ b/presentation/PrefixSum.pptx
@@ -264,7 +264,7 @@
           <a:p>
             <a:fld id="{A6E38D90-A092-44E5-B7B8-8C5442617CCF}" type="datetimeFigureOut">
               <a:rPr lang="en-US" smtClean="0"/>
-              <a:t>8/18/2025</a:t>
+              <a:t>8/20/2025</a:t>
             </a:fld>
             <a:endParaRPr lang="en-US"/>
           </a:p>
@@ -462,7 +462,7 @@
           <a:p>
             <a:fld id="{A6E38D90-A092-44E5-B7B8-8C5442617CCF}" type="datetimeFigureOut">
               <a:rPr lang="en-US" smtClean="0"/>
-              <a:t>8/18/2025</a:t>
+              <a:t>8/20/2025</a:t>
             </a:fld>
             <a:endParaRPr lang="en-US"/>
           </a:p>
@@ -670,7 +670,7 @@
           <a:p>
             <a:fld id="{A6E38D90-A092-44E5-B7B8-8C5442617CCF}" type="datetimeFigureOut">
               <a:rPr lang="en-US" smtClean="0"/>
-              <a:t>8/18/2025</a:t>
+              <a:t>8/20/2025</a:t>
             </a:fld>
             <a:endParaRPr lang="en-US"/>
           </a:p>
@@ -868,7 +868,7 @@
           <a:p>
             <a:fld id="{A6E38D90-A092-44E5-B7B8-8C5442617CCF}" type="datetimeFigureOut">
               <a:rPr lang="en-US" smtClean="0"/>
-              <a:t>8/18/2025</a:t>
+              <a:t>8/20/2025</a:t>
             </a:fld>
             <a:endParaRPr lang="en-US"/>
           </a:p>
@@ -1143,7 +1143,7 @@
           <a:p>
             <a:fld id="{A6E38D90-A092-44E5-B7B8-8C5442617CCF}" type="datetimeFigureOut">
               <a:rPr lang="en-US" smtClean="0"/>
-              <a:t>8/18/2025</a:t>
+              <a:t>8/20/2025</a:t>
             </a:fld>
             <a:endParaRPr lang="en-US"/>
           </a:p>
@@ -1408,7 +1408,7 @@
           <a:p>
             <a:fld id="{A6E38D90-A092-44E5-B7B8-8C5442617CCF}" type="datetimeFigureOut">
               <a:rPr lang="en-US" smtClean="0"/>
-              <a:t>8/18/2025</a:t>
+              <a:t>8/20/2025</a:t>
             </a:fld>
             <a:endParaRPr lang="en-US"/>
           </a:p>
@@ -1820,7 +1820,7 @@
           <a:p>
             <a:fld id="{A6E38D90-A092-44E5-B7B8-8C5442617CCF}" type="datetimeFigureOut">
               <a:rPr lang="en-US" smtClean="0"/>
-              <a:t>8/18/2025</a:t>
+              <a:t>8/20/2025</a:t>
             </a:fld>
             <a:endParaRPr lang="en-US"/>
           </a:p>
@@ -1961,7 +1961,7 @@
           <a:p>
             <a:fld id="{A6E38D90-A092-44E5-B7B8-8C5442617CCF}" type="datetimeFigureOut">
               <a:rPr lang="en-US" smtClean="0"/>
-              <a:t>8/18/2025</a:t>
+              <a:t>8/20/2025</a:t>
             </a:fld>
             <a:endParaRPr lang="en-US"/>
           </a:p>
@@ -2074,7 +2074,7 @@
           <a:p>
             <a:fld id="{A6E38D90-A092-44E5-B7B8-8C5442617CCF}" type="datetimeFigureOut">
               <a:rPr lang="en-US" smtClean="0"/>
-              <a:t>8/18/2025</a:t>
+              <a:t>8/20/2025</a:t>
             </a:fld>
             <a:endParaRPr lang="en-US"/>
           </a:p>
@@ -2385,7 +2385,7 @@
           <a:p>
             <a:fld id="{A6E38D90-A092-44E5-B7B8-8C5442617CCF}" type="datetimeFigureOut">
               <a:rPr lang="en-US" smtClean="0"/>
-              <a:t>8/18/2025</a:t>
+              <a:t>8/20/2025</a:t>
             </a:fld>
             <a:endParaRPr lang="en-US"/>
           </a:p>
@@ -2673,7 +2673,7 @@
           <a:p>
             <a:fld id="{A6E38D90-A092-44E5-B7B8-8C5442617CCF}" type="datetimeFigureOut">
               <a:rPr lang="en-US" smtClean="0"/>
-              <a:t>8/18/2025</a:t>
+              <a:t>8/20/2025</a:t>
             </a:fld>
             <a:endParaRPr lang="en-US"/>
           </a:p>
@@ -2914,7 +2914,7 @@
           <a:p>
             <a:fld id="{A6E38D90-A092-44E5-B7B8-8C5442617CCF}" type="datetimeFigureOut">
               <a:rPr lang="en-US" smtClean="0"/>
-              <a:t>8/18/2025</a:t>
+              <a:t>8/20/2025</a:t>
             </a:fld>
             <a:endParaRPr lang="en-US"/>
           </a:p>
@@ -3363,13 +3363,8 @@
             </a:br>
             <a:r>
               <a:rPr lang="en-US" dirty="0"/>
-              <a:t>Data Structures and </a:t>
-            </a:r>
-            <a:r>
-              <a:rPr lang="en-US" dirty="0" err="1"/>
-              <a:t>Algorigthms</a:t>
-            </a:r>
-            <a:endParaRPr lang="en-US" dirty="0"/>
+              <a:t>Data Structures and Algorithms</a:t>
+            </a:r>
           </a:p>
         </p:txBody>
       </p:sp>

</xml_diff>